<commit_message>
alteração modelo logicorelacionamento medico-ubs repetido segunda e quarta entrega
</commit_message>
<xml_diff>
--- a/quarta entrega/Quarta entrega.pptx
+++ b/quarta entrega/Quarta entrega.pptx
@@ -79,10 +79,8 @@
         <p:txBody>
           <a:bodyPr lIns="0" rIns="0" tIns="0" bIns="0" anchor="ctr"/>
           <a:p>
-            <a:endParaRPr b="0" lang="pt-BR" sz="1800" spc="-1" strike="noStrike">
-              <a:solidFill>
-                <a:srgbClr val="000000"/>
-              </a:solidFill>
+            <a:pPr algn="ctr"/>
+            <a:endParaRPr b="0" lang="pt-BR" sz="4400" spc="-1" strike="noStrike">
               <a:latin typeface="Arial"/>
             </a:endParaRPr>
           </a:p>
@@ -112,10 +110,7 @@
             <a:normAutofit/>
           </a:bodyPr>
           <a:p>
-            <a:endParaRPr b="0" lang="pt-BR" sz="2800" spc="-1" strike="noStrike">
-              <a:solidFill>
-                <a:srgbClr val="000000"/>
-              </a:solidFill>
+            <a:endParaRPr b="0" lang="pt-BR" sz="3200" spc="-1" strike="noStrike">
               <a:latin typeface="Arial"/>
             </a:endParaRPr>
           </a:p>
@@ -145,10 +140,7 @@
             <a:normAutofit/>
           </a:bodyPr>
           <a:p>
-            <a:endParaRPr b="0" lang="pt-BR" sz="2800" spc="-1" strike="noStrike">
-              <a:solidFill>
-                <a:srgbClr val="000000"/>
-              </a:solidFill>
+            <a:endParaRPr b="0" lang="pt-BR" sz="3200" spc="-1" strike="noStrike">
               <a:latin typeface="Arial"/>
             </a:endParaRPr>
           </a:p>
@@ -198,10 +190,8 @@
         <p:txBody>
           <a:bodyPr lIns="0" rIns="0" tIns="0" bIns="0" anchor="ctr"/>
           <a:p>
-            <a:endParaRPr b="0" lang="pt-BR" sz="1800" spc="-1" strike="noStrike">
-              <a:solidFill>
-                <a:srgbClr val="000000"/>
-              </a:solidFill>
+            <a:pPr algn="ctr"/>
+            <a:endParaRPr b="0" lang="pt-BR" sz="4400" spc="-1" strike="noStrike">
               <a:latin typeface="Arial"/>
             </a:endParaRPr>
           </a:p>
@@ -231,10 +221,7 @@
             <a:normAutofit/>
           </a:bodyPr>
           <a:p>
-            <a:endParaRPr b="0" lang="pt-BR" sz="2800" spc="-1" strike="noStrike">
-              <a:solidFill>
-                <a:srgbClr val="000000"/>
-              </a:solidFill>
+            <a:endParaRPr b="0" lang="pt-BR" sz="3200" spc="-1" strike="noStrike">
               <a:latin typeface="Arial"/>
             </a:endParaRPr>
           </a:p>
@@ -264,10 +251,7 @@
             <a:normAutofit/>
           </a:bodyPr>
           <a:p>
-            <a:endParaRPr b="0" lang="pt-BR" sz="2800" spc="-1" strike="noStrike">
-              <a:solidFill>
-                <a:srgbClr val="000000"/>
-              </a:solidFill>
+            <a:endParaRPr b="0" lang="pt-BR" sz="3200" spc="-1" strike="noStrike">
               <a:latin typeface="Arial"/>
             </a:endParaRPr>
           </a:p>
@@ -297,10 +281,7 @@
             <a:normAutofit/>
           </a:bodyPr>
           <a:p>
-            <a:endParaRPr b="0" lang="pt-BR" sz="2800" spc="-1" strike="noStrike">
-              <a:solidFill>
-                <a:srgbClr val="000000"/>
-              </a:solidFill>
+            <a:endParaRPr b="0" lang="pt-BR" sz="3200" spc="-1" strike="noStrike">
               <a:latin typeface="Arial"/>
             </a:endParaRPr>
           </a:p>
@@ -330,10 +311,7 @@
             <a:normAutofit/>
           </a:bodyPr>
           <a:p>
-            <a:endParaRPr b="0" lang="pt-BR" sz="2800" spc="-1" strike="noStrike">
-              <a:solidFill>
-                <a:srgbClr val="000000"/>
-              </a:solidFill>
+            <a:endParaRPr b="0" lang="pt-BR" sz="3200" spc="-1" strike="noStrike">
               <a:latin typeface="Arial"/>
             </a:endParaRPr>
           </a:p>
@@ -383,10 +361,8 @@
         <p:txBody>
           <a:bodyPr lIns="0" rIns="0" tIns="0" bIns="0" anchor="ctr"/>
           <a:p>
-            <a:endParaRPr b="0" lang="pt-BR" sz="1800" spc="-1" strike="noStrike">
-              <a:solidFill>
-                <a:srgbClr val="000000"/>
-              </a:solidFill>
+            <a:pPr algn="ctr"/>
+            <a:endParaRPr b="0" lang="pt-BR" sz="4400" spc="-1" strike="noStrike">
               <a:latin typeface="Arial"/>
             </a:endParaRPr>
           </a:p>
@@ -416,10 +392,7 @@
             <a:normAutofit/>
           </a:bodyPr>
           <a:p>
-            <a:endParaRPr b="0" lang="pt-BR" sz="2800" spc="-1" strike="noStrike">
-              <a:solidFill>
-                <a:srgbClr val="000000"/>
-              </a:solidFill>
+            <a:endParaRPr b="0" lang="pt-BR" sz="3200" spc="-1" strike="noStrike">
               <a:latin typeface="Arial"/>
             </a:endParaRPr>
           </a:p>
@@ -449,10 +422,7 @@
             <a:normAutofit/>
           </a:bodyPr>
           <a:p>
-            <a:endParaRPr b="0" lang="pt-BR" sz="2800" spc="-1" strike="noStrike">
-              <a:solidFill>
-                <a:srgbClr val="000000"/>
-              </a:solidFill>
+            <a:endParaRPr b="0" lang="pt-BR" sz="3200" spc="-1" strike="noStrike">
               <a:latin typeface="Arial"/>
             </a:endParaRPr>
           </a:p>
@@ -482,10 +452,7 @@
             <a:normAutofit/>
           </a:bodyPr>
           <a:p>
-            <a:endParaRPr b="0" lang="pt-BR" sz="2800" spc="-1" strike="noStrike">
-              <a:solidFill>
-                <a:srgbClr val="000000"/>
-              </a:solidFill>
+            <a:endParaRPr b="0" lang="pt-BR" sz="3200" spc="-1" strike="noStrike">
               <a:latin typeface="Arial"/>
             </a:endParaRPr>
           </a:p>
@@ -515,10 +482,7 @@
             <a:normAutofit/>
           </a:bodyPr>
           <a:p>
-            <a:endParaRPr b="0" lang="pt-BR" sz="2800" spc="-1" strike="noStrike">
-              <a:solidFill>
-                <a:srgbClr val="000000"/>
-              </a:solidFill>
+            <a:endParaRPr b="0" lang="pt-BR" sz="3200" spc="-1" strike="noStrike">
               <a:latin typeface="Arial"/>
             </a:endParaRPr>
           </a:p>
@@ -548,10 +512,7 @@
             <a:normAutofit/>
           </a:bodyPr>
           <a:p>
-            <a:endParaRPr b="0" lang="pt-BR" sz="2800" spc="-1" strike="noStrike">
-              <a:solidFill>
-                <a:srgbClr val="000000"/>
-              </a:solidFill>
+            <a:endParaRPr b="0" lang="pt-BR" sz="3200" spc="-1" strike="noStrike">
               <a:latin typeface="Arial"/>
             </a:endParaRPr>
           </a:p>
@@ -581,10 +542,7 @@
             <a:normAutofit/>
           </a:bodyPr>
           <a:p>
-            <a:endParaRPr b="0" lang="pt-BR" sz="2800" spc="-1" strike="noStrike">
-              <a:solidFill>
-                <a:srgbClr val="000000"/>
-              </a:solidFill>
+            <a:endParaRPr b="0" lang="pt-BR" sz="3200" spc="-1" strike="noStrike">
               <a:latin typeface="Arial"/>
             </a:endParaRPr>
           </a:p>
@@ -634,10 +592,8 @@
         <p:txBody>
           <a:bodyPr lIns="0" rIns="0" tIns="0" bIns="0" anchor="ctr"/>
           <a:p>
-            <a:endParaRPr b="0" lang="pt-BR" sz="1800" spc="-1" strike="noStrike">
-              <a:solidFill>
-                <a:srgbClr val="000000"/>
-              </a:solidFill>
+            <a:pPr algn="ctr"/>
+            <a:endParaRPr b="0" lang="pt-BR" sz="4400" spc="-1" strike="noStrike">
               <a:latin typeface="Arial"/>
             </a:endParaRPr>
           </a:p>
@@ -716,10 +672,8 @@
         <p:txBody>
           <a:bodyPr lIns="0" rIns="0" tIns="0" bIns="0" anchor="ctr"/>
           <a:p>
-            <a:endParaRPr b="0" lang="pt-BR" sz="1800" spc="-1" strike="noStrike">
-              <a:solidFill>
-                <a:srgbClr val="000000"/>
-              </a:solidFill>
+            <a:pPr algn="ctr"/>
+            <a:endParaRPr b="0" lang="pt-BR" sz="4400" spc="-1" strike="noStrike">
               <a:latin typeface="Arial"/>
             </a:endParaRPr>
           </a:p>
@@ -749,10 +703,7 @@
             <a:normAutofit/>
           </a:bodyPr>
           <a:p>
-            <a:endParaRPr b="0" lang="pt-BR" sz="2800" spc="-1" strike="noStrike">
-              <a:solidFill>
-                <a:srgbClr val="000000"/>
-              </a:solidFill>
+            <a:endParaRPr b="0" lang="pt-BR" sz="3200" spc="-1" strike="noStrike">
               <a:latin typeface="Arial"/>
             </a:endParaRPr>
           </a:p>
@@ -802,10 +753,8 @@
         <p:txBody>
           <a:bodyPr lIns="0" rIns="0" tIns="0" bIns="0" anchor="ctr"/>
           <a:p>
-            <a:endParaRPr b="0" lang="pt-BR" sz="1800" spc="-1" strike="noStrike">
-              <a:solidFill>
-                <a:srgbClr val="000000"/>
-              </a:solidFill>
+            <a:pPr algn="ctr"/>
+            <a:endParaRPr b="0" lang="pt-BR" sz="4400" spc="-1" strike="noStrike">
               <a:latin typeface="Arial"/>
             </a:endParaRPr>
           </a:p>
@@ -835,10 +784,7 @@
             <a:normAutofit/>
           </a:bodyPr>
           <a:p>
-            <a:endParaRPr b="0" lang="pt-BR" sz="2800" spc="-1" strike="noStrike">
-              <a:solidFill>
-                <a:srgbClr val="000000"/>
-              </a:solidFill>
+            <a:endParaRPr b="0" lang="pt-BR" sz="3200" spc="-1" strike="noStrike">
               <a:latin typeface="Arial"/>
             </a:endParaRPr>
           </a:p>
@@ -868,10 +814,7 @@
             <a:normAutofit/>
           </a:bodyPr>
           <a:p>
-            <a:endParaRPr b="0" lang="pt-BR" sz="2800" spc="-1" strike="noStrike">
-              <a:solidFill>
-                <a:srgbClr val="000000"/>
-              </a:solidFill>
+            <a:endParaRPr b="0" lang="pt-BR" sz="3200" spc="-1" strike="noStrike">
               <a:latin typeface="Arial"/>
             </a:endParaRPr>
           </a:p>
@@ -921,10 +864,8 @@
         <p:txBody>
           <a:bodyPr lIns="0" rIns="0" tIns="0" bIns="0" anchor="ctr"/>
           <a:p>
-            <a:endParaRPr b="0" lang="pt-BR" sz="1800" spc="-1" strike="noStrike">
-              <a:solidFill>
-                <a:srgbClr val="000000"/>
-              </a:solidFill>
+            <a:pPr algn="ctr"/>
+            <a:endParaRPr b="0" lang="pt-BR" sz="4400" spc="-1" strike="noStrike">
               <a:latin typeface="Arial"/>
             </a:endParaRPr>
           </a:p>
@@ -1025,10 +966,8 @@
         <p:txBody>
           <a:bodyPr lIns="0" rIns="0" tIns="0" bIns="0" anchor="ctr"/>
           <a:p>
-            <a:endParaRPr b="0" lang="pt-BR" sz="1800" spc="-1" strike="noStrike">
-              <a:solidFill>
-                <a:srgbClr val="000000"/>
-              </a:solidFill>
+            <a:pPr algn="ctr"/>
+            <a:endParaRPr b="0" lang="pt-BR" sz="4400" spc="-1" strike="noStrike">
               <a:latin typeface="Arial"/>
             </a:endParaRPr>
           </a:p>
@@ -1058,10 +997,7 @@
             <a:normAutofit/>
           </a:bodyPr>
           <a:p>
-            <a:endParaRPr b="0" lang="pt-BR" sz="2800" spc="-1" strike="noStrike">
-              <a:solidFill>
-                <a:srgbClr val="000000"/>
-              </a:solidFill>
+            <a:endParaRPr b="0" lang="pt-BR" sz="3200" spc="-1" strike="noStrike">
               <a:latin typeface="Arial"/>
             </a:endParaRPr>
           </a:p>
@@ -1091,10 +1027,7 @@
             <a:normAutofit/>
           </a:bodyPr>
           <a:p>
-            <a:endParaRPr b="0" lang="pt-BR" sz="2800" spc="-1" strike="noStrike">
-              <a:solidFill>
-                <a:srgbClr val="000000"/>
-              </a:solidFill>
+            <a:endParaRPr b="0" lang="pt-BR" sz="3200" spc="-1" strike="noStrike">
               <a:latin typeface="Arial"/>
             </a:endParaRPr>
           </a:p>
@@ -1124,10 +1057,7 @@
             <a:normAutofit/>
           </a:bodyPr>
           <a:p>
-            <a:endParaRPr b="0" lang="pt-BR" sz="2800" spc="-1" strike="noStrike">
-              <a:solidFill>
-                <a:srgbClr val="000000"/>
-              </a:solidFill>
+            <a:endParaRPr b="0" lang="pt-BR" sz="3200" spc="-1" strike="noStrike">
               <a:latin typeface="Arial"/>
             </a:endParaRPr>
           </a:p>
@@ -1177,10 +1107,8 @@
         <p:txBody>
           <a:bodyPr lIns="0" rIns="0" tIns="0" bIns="0" anchor="ctr"/>
           <a:p>
-            <a:endParaRPr b="0" lang="pt-BR" sz="1800" spc="-1" strike="noStrike">
-              <a:solidFill>
-                <a:srgbClr val="000000"/>
-              </a:solidFill>
+            <a:pPr algn="ctr"/>
+            <a:endParaRPr b="0" lang="pt-BR" sz="4400" spc="-1" strike="noStrike">
               <a:latin typeface="Arial"/>
             </a:endParaRPr>
           </a:p>
@@ -1210,10 +1138,7 @@
             <a:normAutofit/>
           </a:bodyPr>
           <a:p>
-            <a:endParaRPr b="0" lang="pt-BR" sz="2800" spc="-1" strike="noStrike">
-              <a:solidFill>
-                <a:srgbClr val="000000"/>
-              </a:solidFill>
+            <a:endParaRPr b="0" lang="pt-BR" sz="3200" spc="-1" strike="noStrike">
               <a:latin typeface="Arial"/>
             </a:endParaRPr>
           </a:p>
@@ -1243,10 +1168,7 @@
             <a:normAutofit/>
           </a:bodyPr>
           <a:p>
-            <a:endParaRPr b="0" lang="pt-BR" sz="2800" spc="-1" strike="noStrike">
-              <a:solidFill>
-                <a:srgbClr val="000000"/>
-              </a:solidFill>
+            <a:endParaRPr b="0" lang="pt-BR" sz="3200" spc="-1" strike="noStrike">
               <a:latin typeface="Arial"/>
             </a:endParaRPr>
           </a:p>
@@ -1276,10 +1198,7 @@
             <a:normAutofit/>
           </a:bodyPr>
           <a:p>
-            <a:endParaRPr b="0" lang="pt-BR" sz="2800" spc="-1" strike="noStrike">
-              <a:solidFill>
-                <a:srgbClr val="000000"/>
-              </a:solidFill>
+            <a:endParaRPr b="0" lang="pt-BR" sz="3200" spc="-1" strike="noStrike">
               <a:latin typeface="Arial"/>
             </a:endParaRPr>
           </a:p>
@@ -1329,10 +1248,8 @@
         <p:txBody>
           <a:bodyPr lIns="0" rIns="0" tIns="0" bIns="0" anchor="ctr"/>
           <a:p>
-            <a:endParaRPr b="0" lang="pt-BR" sz="1800" spc="-1" strike="noStrike">
-              <a:solidFill>
-                <a:srgbClr val="000000"/>
-              </a:solidFill>
+            <a:pPr algn="ctr"/>
+            <a:endParaRPr b="0" lang="pt-BR" sz="4400" spc="-1" strike="noStrike">
               <a:latin typeface="Arial"/>
             </a:endParaRPr>
           </a:p>
@@ -1362,10 +1279,7 @@
             <a:normAutofit/>
           </a:bodyPr>
           <a:p>
-            <a:endParaRPr b="0" lang="pt-BR" sz="2800" spc="-1" strike="noStrike">
-              <a:solidFill>
-                <a:srgbClr val="000000"/>
-              </a:solidFill>
+            <a:endParaRPr b="0" lang="pt-BR" sz="3200" spc="-1" strike="noStrike">
               <a:latin typeface="Arial"/>
             </a:endParaRPr>
           </a:p>
@@ -1395,10 +1309,7 @@
             <a:normAutofit/>
           </a:bodyPr>
           <a:p>
-            <a:endParaRPr b="0" lang="pt-BR" sz="2800" spc="-1" strike="noStrike">
-              <a:solidFill>
-                <a:srgbClr val="000000"/>
-              </a:solidFill>
+            <a:endParaRPr b="0" lang="pt-BR" sz="3200" spc="-1" strike="noStrike">
               <a:latin typeface="Arial"/>
             </a:endParaRPr>
           </a:p>
@@ -1428,10 +1339,7 @@
             <a:normAutofit/>
           </a:bodyPr>
           <a:p>
-            <a:endParaRPr b="0" lang="pt-BR" sz="2800" spc="-1" strike="noStrike">
-              <a:solidFill>
-                <a:srgbClr val="000000"/>
-              </a:solidFill>
+            <a:endParaRPr b="0" lang="pt-BR" sz="3200" spc="-1" strike="noStrike">
               <a:latin typeface="Arial"/>
             </a:endParaRPr>
           </a:p>
@@ -1488,19 +1396,14 @@
         <p:txBody>
           <a:bodyPr lIns="0" rIns="0" tIns="0" bIns="0" anchor="ctr"/>
           <a:p>
+            <a:pPr algn="ctr"/>
             <a:r>
-              <a:rPr b="0" lang="pt-BR" sz="1800" spc="-1" strike="noStrike">
-                <a:solidFill>
-                  <a:srgbClr val="000000"/>
-                </a:solidFill>
+              <a:rPr b="0" lang="pt-BR" sz="4400" spc="-1" strike="noStrike">
                 <a:latin typeface="Arial"/>
               </a:rPr>
               <a:t>Clique para editar o formato do texto do título</a:t>
             </a:r>
-            <a:endParaRPr b="0" lang="pt-BR" sz="1800" spc="-1" strike="noStrike">
-              <a:solidFill>
-                <a:srgbClr val="000000"/>
-              </a:solidFill>
+            <a:endParaRPr b="0" lang="pt-BR" sz="4400" spc="-1" strike="noStrike">
               <a:latin typeface="Arial"/>
             </a:endParaRPr>
           </a:p>
@@ -1542,18 +1445,12 @@
               <a:buChar char=""/>
             </a:pPr>
             <a:r>
-              <a:rPr b="0" lang="pt-BR" sz="2800" spc="-1" strike="noStrike">
-                <a:solidFill>
-                  <a:srgbClr val="000000"/>
-                </a:solidFill>
+              <a:rPr b="0" lang="pt-BR" sz="3200" spc="-1" strike="noStrike">
                 <a:latin typeface="Arial"/>
               </a:rPr>
               <a:t>Clique para editar o formato do texto da estrutura de tópicos</a:t>
             </a:r>
-            <a:endParaRPr b="0" lang="pt-BR" sz="2800" spc="-1" strike="noStrike">
-              <a:solidFill>
-                <a:srgbClr val="000000"/>
-              </a:solidFill>
+            <a:endParaRPr b="0" lang="pt-BR" sz="3200" spc="-1" strike="noStrike">
               <a:latin typeface="Arial"/>
             </a:endParaRPr>
           </a:p>
@@ -1570,18 +1467,12 @@
               <a:buChar char=""/>
             </a:pPr>
             <a:r>
-              <a:rPr b="0" lang="pt-BR" sz="2000" spc="-1" strike="noStrike">
-                <a:solidFill>
-                  <a:srgbClr val="000000"/>
-                </a:solidFill>
+              <a:rPr b="0" lang="pt-BR" sz="2800" spc="-1" strike="noStrike">
                 <a:latin typeface="Arial"/>
               </a:rPr>
               <a:t>2.º nível da estrutura de tópicos</a:t>
             </a:r>
-            <a:endParaRPr b="0" lang="pt-BR" sz="2000" spc="-1" strike="noStrike">
-              <a:solidFill>
-                <a:srgbClr val="000000"/>
-              </a:solidFill>
+            <a:endParaRPr b="0" lang="pt-BR" sz="2800" spc="-1" strike="noStrike">
               <a:latin typeface="Arial"/>
             </a:endParaRPr>
           </a:p>
@@ -1598,18 +1489,12 @@
               <a:buChar char=""/>
             </a:pPr>
             <a:r>
-              <a:rPr b="0" lang="pt-BR" sz="1800" spc="-1" strike="noStrike">
-                <a:solidFill>
-                  <a:srgbClr val="000000"/>
-                </a:solidFill>
+              <a:rPr b="0" lang="pt-BR" sz="2400" spc="-1" strike="noStrike">
                 <a:latin typeface="Arial"/>
               </a:rPr>
               <a:t>3.º nível da estrutura de tópicos</a:t>
             </a:r>
-            <a:endParaRPr b="0" lang="pt-BR" sz="1800" spc="-1" strike="noStrike">
-              <a:solidFill>
-                <a:srgbClr val="000000"/>
-              </a:solidFill>
+            <a:endParaRPr b="0" lang="pt-BR" sz="2400" spc="-1" strike="noStrike">
               <a:latin typeface="Arial"/>
             </a:endParaRPr>
           </a:p>
@@ -1626,18 +1511,12 @@
               <a:buChar char=""/>
             </a:pPr>
             <a:r>
-              <a:rPr b="0" lang="pt-BR" sz="1800" spc="-1" strike="noStrike">
-                <a:solidFill>
-                  <a:srgbClr val="000000"/>
-                </a:solidFill>
+              <a:rPr b="0" lang="pt-BR" sz="2000" spc="-1" strike="noStrike">
                 <a:latin typeface="Arial"/>
               </a:rPr>
               <a:t>4.º nível da estrutura de tópicos</a:t>
             </a:r>
-            <a:endParaRPr b="0" lang="pt-BR" sz="1800" spc="-1" strike="noStrike">
-              <a:solidFill>
-                <a:srgbClr val="000000"/>
-              </a:solidFill>
+            <a:endParaRPr b="0" lang="pt-BR" sz="2000" spc="-1" strike="noStrike">
               <a:latin typeface="Arial"/>
             </a:endParaRPr>
           </a:p>
@@ -1655,17 +1534,11 @@
             </a:pPr>
             <a:r>
               <a:rPr b="0" lang="pt-BR" sz="2000" spc="-1" strike="noStrike">
-                <a:solidFill>
-                  <a:srgbClr val="000000"/>
-                </a:solidFill>
                 <a:latin typeface="Arial"/>
               </a:rPr>
               <a:t>5.º nível da estrutura de tópicos</a:t>
             </a:r>
             <a:endParaRPr b="0" lang="pt-BR" sz="2000" spc="-1" strike="noStrike">
-              <a:solidFill>
-                <a:srgbClr val="000000"/>
-              </a:solidFill>
               <a:latin typeface="Arial"/>
             </a:endParaRPr>
           </a:p>
@@ -1683,17 +1556,11 @@
             </a:pPr>
             <a:r>
               <a:rPr b="0" lang="pt-BR" sz="2000" spc="-1" strike="noStrike">
-                <a:solidFill>
-                  <a:srgbClr val="000000"/>
-                </a:solidFill>
                 <a:latin typeface="Arial"/>
               </a:rPr>
               <a:t>6.º nível da estrutura de tópicos</a:t>
             </a:r>
             <a:endParaRPr b="0" lang="pt-BR" sz="2000" spc="-1" strike="noStrike">
-              <a:solidFill>
-                <a:srgbClr val="000000"/>
-              </a:solidFill>
               <a:latin typeface="Arial"/>
             </a:endParaRPr>
           </a:p>
@@ -1711,17 +1578,11 @@
             </a:pPr>
             <a:r>
               <a:rPr b="0" lang="pt-BR" sz="2000" spc="-1" strike="noStrike">
-                <a:solidFill>
-                  <a:srgbClr val="000000"/>
-                </a:solidFill>
                 <a:latin typeface="Arial"/>
               </a:rPr>
               <a:t>7.º nível da estrutura de tópicos</a:t>
             </a:r>
             <a:endParaRPr b="0" lang="pt-BR" sz="2000" spc="-1" strike="noStrike">
-              <a:solidFill>
-                <a:srgbClr val="000000"/>
-              </a:solidFill>
               <a:latin typeface="Arial"/>
             </a:endParaRPr>
           </a:p>
@@ -1780,7 +1641,7 @@
         <p:spPr>
           <a:xfrm>
             <a:off x="0" y="0"/>
-            <a:ext cx="12188880" cy="1583280"/>
+            <a:ext cx="12188520" cy="1582920"/>
           </a:xfrm>
           <a:prstGeom prst="rect">
             <a:avLst/>
@@ -1812,7 +1673,7 @@
         <p:spPr>
           <a:xfrm>
             <a:off x="10561680" y="0"/>
-            <a:ext cx="1080000" cy="2503800"/>
+            <a:ext cx="1079640" cy="2503440"/>
           </a:xfrm>
           <a:prstGeom prst="rect">
             <a:avLst/>
@@ -1831,7 +1692,7 @@
         <p:spPr>
           <a:xfrm>
             <a:off x="504000" y="6479280"/>
-            <a:ext cx="11126880" cy="716760"/>
+            <a:ext cx="11126520" cy="716400"/>
           </a:xfrm>
           <a:prstGeom prst="rect">
             <a:avLst/>
@@ -1894,7 +1755,7 @@
         <p:spPr>
           <a:xfrm>
             <a:off x="235080" y="283680"/>
-            <a:ext cx="3997440" cy="1016280"/>
+            <a:ext cx="3997080" cy="1015920"/>
           </a:xfrm>
           <a:prstGeom prst="rect">
             <a:avLst/>
@@ -1913,7 +1774,7 @@
         <p:spPr>
           <a:xfrm>
             <a:off x="3603240" y="3470040"/>
-            <a:ext cx="4928760" cy="1122120"/>
+            <a:ext cx="4928400" cy="1121760"/>
           </a:xfrm>
           <a:prstGeom prst="rect">
             <a:avLst/>
@@ -2098,7 +1959,7 @@
         <p:spPr>
           <a:xfrm>
             <a:off x="0" y="0"/>
-            <a:ext cx="12188880" cy="1583280"/>
+            <a:ext cx="12188520" cy="1582920"/>
           </a:xfrm>
           <a:prstGeom prst="rect">
             <a:avLst/>
@@ -2126,7 +1987,7 @@
         <p:spPr>
           <a:xfrm>
             <a:off x="504000" y="6479280"/>
-            <a:ext cx="11126880" cy="716760"/>
+            <a:ext cx="11126520" cy="716400"/>
           </a:xfrm>
           <a:prstGeom prst="rect">
             <a:avLst/>
@@ -2189,7 +2050,7 @@
         <p:spPr>
           <a:xfrm>
             <a:off x="235080" y="283680"/>
-            <a:ext cx="3997440" cy="1016280"/>
+            <a:ext cx="3997080" cy="1015920"/>
           </a:xfrm>
           <a:prstGeom prst="rect">
             <a:avLst/>
@@ -2212,7 +2073,7 @@
         <p:spPr>
           <a:xfrm>
             <a:off x="103320" y="1738800"/>
-            <a:ext cx="11960640" cy="4835160"/>
+            <a:ext cx="11960280" cy="4834800"/>
           </a:xfrm>
           <a:prstGeom prst="rect">
             <a:avLst/>
@@ -2235,7 +2096,7 @@
         <p:spPr>
           <a:xfrm>
             <a:off x="10561680" y="0"/>
-            <a:ext cx="1080000" cy="2503800"/>
+            <a:ext cx="1079640" cy="2503440"/>
           </a:xfrm>
           <a:prstGeom prst="rect">
             <a:avLst/>
@@ -2310,7 +2171,7 @@
         <p:spPr>
           <a:xfrm>
             <a:off x="504000" y="6479280"/>
-            <a:ext cx="11126880" cy="716760"/>
+            <a:ext cx="11126520" cy="716400"/>
           </a:xfrm>
           <a:prstGeom prst="rect">
             <a:avLst/>
@@ -2368,8 +2229,8 @@
         </p:nvSpPr>
         <p:spPr>
           <a:xfrm rot="16200000">
-            <a:off x="-4992480" y="2727360"/>
-            <a:ext cx="10610280" cy="676440"/>
+            <a:off x="-4992120" y="2727720"/>
+            <a:ext cx="10609920" cy="676080"/>
           </a:xfrm>
           <a:prstGeom prst="rect">
             <a:avLst/>
@@ -2421,8 +2282,8 @@
         </p:blipFill>
         <p:spPr>
           <a:xfrm>
-            <a:off x="1810080" y="187920"/>
-            <a:ext cx="8629920" cy="6076080"/>
+            <a:off x="878760" y="32760"/>
+            <a:ext cx="10514880" cy="6857640"/>
           </a:xfrm>
           <a:prstGeom prst="rect">
             <a:avLst/>
@@ -2501,7 +2362,7 @@
         <p:spPr>
           <a:xfrm>
             <a:off x="235080" y="283680"/>
-            <a:ext cx="3997440" cy="1016280"/>
+            <a:ext cx="3997080" cy="1015920"/>
           </a:xfrm>
           <a:prstGeom prst="rect">
             <a:avLst/>
@@ -2519,8 +2380,8 @@
         </p:nvSpPr>
         <p:spPr>
           <a:xfrm rot="16200000">
-            <a:off x="-4992480" y="2727360"/>
-            <a:ext cx="10610280" cy="676440"/>
+            <a:off x="-4992120" y="2727720"/>
+            <a:ext cx="10609920" cy="676080"/>
           </a:xfrm>
           <a:prstGeom prst="rect">
             <a:avLst/>
@@ -2550,7 +2411,7 @@
         <p:spPr>
           <a:xfrm>
             <a:off x="0" y="0"/>
-            <a:ext cx="12191760" cy="6857640"/>
+            <a:ext cx="12191400" cy="6857280"/>
           </a:xfrm>
           <a:prstGeom prst="rect">
             <a:avLst/>
@@ -2569,7 +2430,7 @@
         <p:spPr>
           <a:xfrm>
             <a:off x="504000" y="6479280"/>
-            <a:ext cx="11126880" cy="716760"/>
+            <a:ext cx="11126520" cy="716400"/>
           </a:xfrm>
           <a:prstGeom prst="rect">
             <a:avLst/>
@@ -2632,7 +2493,7 @@
         <p:spPr>
           <a:xfrm>
             <a:off x="10561680" y="0"/>
-            <a:ext cx="1080000" cy="2503800"/>
+            <a:ext cx="1079640" cy="2503440"/>
           </a:xfrm>
           <a:prstGeom prst="rect">
             <a:avLst/>
@@ -2711,7 +2572,7 @@
         <p:spPr>
           <a:xfrm>
             <a:off x="104760" y="0"/>
-            <a:ext cx="11929680" cy="6857640"/>
+            <a:ext cx="11929320" cy="6857280"/>
           </a:xfrm>
           <a:prstGeom prst="rect">
             <a:avLst/>
@@ -2734,7 +2595,7 @@
         <p:spPr>
           <a:xfrm>
             <a:off x="10561680" y="0"/>
-            <a:ext cx="1080000" cy="2503800"/>
+            <a:ext cx="1079640" cy="2503440"/>
           </a:xfrm>
           <a:prstGeom prst="rect">
             <a:avLst/>
@@ -2753,7 +2614,7 @@
         <p:spPr>
           <a:xfrm>
             <a:off x="504000" y="6479280"/>
-            <a:ext cx="11126880" cy="716760"/>
+            <a:ext cx="11126520" cy="716400"/>
           </a:xfrm>
           <a:prstGeom prst="rect">
             <a:avLst/>
@@ -2867,8 +2728,8 @@
         </p:nvSpPr>
         <p:spPr>
           <a:xfrm rot="16200000">
-            <a:off x="-4416480" y="2727360"/>
-            <a:ext cx="10610280" cy="676440"/>
+            <a:off x="-4416120" y="2727720"/>
+            <a:ext cx="10609920" cy="676080"/>
           </a:xfrm>
           <a:prstGeom prst="rect">
             <a:avLst/>
@@ -2921,7 +2782,7 @@
         <p:spPr>
           <a:xfrm>
             <a:off x="0" y="0"/>
-            <a:ext cx="12191760" cy="6857640"/>
+            <a:ext cx="12191400" cy="6857280"/>
           </a:xfrm>
           <a:prstGeom prst="rect">
             <a:avLst/>
@@ -2940,7 +2801,7 @@
         <p:spPr>
           <a:xfrm>
             <a:off x="504000" y="6479280"/>
-            <a:ext cx="11126880" cy="716760"/>
+            <a:ext cx="11126520" cy="716400"/>
           </a:xfrm>
           <a:prstGeom prst="rect">
             <a:avLst/>
@@ -3003,7 +2864,7 @@
         <p:spPr>
           <a:xfrm>
             <a:off x="10561680" y="0"/>
-            <a:ext cx="1080000" cy="2503800"/>
+            <a:ext cx="1079640" cy="2503440"/>
           </a:xfrm>
           <a:prstGeom prst="rect">
             <a:avLst/>
@@ -3077,8 +2938,8 @@
         </p:nvSpPr>
         <p:spPr>
           <a:xfrm rot="16200000">
-            <a:off x="-4416480" y="2727360"/>
-            <a:ext cx="10610280" cy="676440"/>
+            <a:off x="-4416120" y="2727720"/>
+            <a:ext cx="10609920" cy="676080"/>
           </a:xfrm>
           <a:prstGeom prst="rect">
             <a:avLst/>
@@ -3131,7 +2992,7 @@
         <p:spPr>
           <a:xfrm>
             <a:off x="84240" y="0"/>
-            <a:ext cx="12107520" cy="6857640"/>
+            <a:ext cx="12107160" cy="6857280"/>
           </a:xfrm>
           <a:prstGeom prst="rect">
             <a:avLst/>
@@ -3150,7 +3011,7 @@
         <p:spPr>
           <a:xfrm>
             <a:off x="504000" y="6479280"/>
-            <a:ext cx="11126880" cy="716760"/>
+            <a:ext cx="11126520" cy="716400"/>
           </a:xfrm>
           <a:prstGeom prst="rect">
             <a:avLst/>
@@ -3213,7 +3074,7 @@
         <p:spPr>
           <a:xfrm>
             <a:off x="10561680" y="0"/>
-            <a:ext cx="1080000" cy="2503800"/>
+            <a:ext cx="1079640" cy="2503440"/>
           </a:xfrm>
           <a:prstGeom prst="rect">
             <a:avLst/>

</xml_diff>